<commit_message>
IDE 13 Lizenzen erneuert
</commit_message>
<xml_diff>
--- a/training-cards/music moves/Ideas (IDE)/ger/apprentice/ger_IDE_13_Raus_aus_dem_Schneckenhaus_MM_A.pptx
+++ b/training-cards/music moves/Ideas (IDE)/ger/apprentice/ger_IDE_13_Raus_aus_dem_Schneckenhaus_MM_A.pptx
@@ -105,6 +105,22 @@
       </a:defRPr>
     </a:lvl9pPr>
   </p:defaultTextStyle>
+  <p:extLst>
+    <p:ext uri="{EFAFB233-063F-42B5-8137-9DF3F51BA10A}">
+      <p15:sldGuideLst xmlns:p15="http://schemas.microsoft.com/office/powerpoint/2012/main">
+        <p15:guide id="1" orient="horz" pos="652">
+          <p15:clr>
+            <a:srgbClr val="A4A3A4"/>
+          </p15:clr>
+        </p15:guide>
+        <p15:guide id="2">
+          <p15:clr>
+            <a:srgbClr val="A4A3A4"/>
+          </p15:clr>
+        </p15:guide>
+      </p15:sldGuideLst>
+    </p:ext>
+  </p:extLst>
 </p:presentation>
 </file>
 
@@ -153,10 +169,9 @@
           </a:lstStyle>
           <a:p>
             <a:r>
-              <a:rPr lang="de-DE" dirty="0" smtClean="0"/>
+              <a:rPr lang="de-DE" dirty="0"/>
               <a:t>TITEL HINZUFÜGEN</a:t>
             </a:r>
-            <a:endParaRPr lang="de-DE" dirty="0"/>
           </a:p>
         </p:txBody>
       </p:sp>
@@ -187,35 +202,35 @@
           <a:p>
             <a:pPr lvl="0"/>
             <a:r>
-              <a:rPr lang="de-DE" smtClean="0"/>
+              <a:rPr lang="de-DE"/>
               <a:t>Mastertextformat bearbeiten</a:t>
             </a:r>
           </a:p>
           <a:p>
             <a:pPr lvl="1"/>
             <a:r>
-              <a:rPr lang="de-DE" smtClean="0"/>
+              <a:rPr lang="de-DE"/>
               <a:t>Zweite Ebene</a:t>
             </a:r>
           </a:p>
           <a:p>
             <a:pPr lvl="2"/>
             <a:r>
-              <a:rPr lang="de-DE" smtClean="0"/>
+              <a:rPr lang="de-DE"/>
               <a:t>Dritte Ebene</a:t>
             </a:r>
           </a:p>
           <a:p>
             <a:pPr lvl="3"/>
             <a:r>
-              <a:rPr lang="de-DE" smtClean="0"/>
+              <a:rPr lang="de-DE"/>
               <a:t>Vierte Ebene</a:t>
             </a:r>
           </a:p>
           <a:p>
             <a:pPr lvl="4"/>
             <a:r>
-              <a:rPr lang="de-DE" smtClean="0"/>
+              <a:rPr lang="de-DE"/>
               <a:t>Fünfte Ebene</a:t>
             </a:r>
             <a:endParaRPr lang="de-DE" dirty="0"/>
@@ -262,7 +277,7 @@
               <a:buNone/>
             </a:pPr>
             <a:r>
-              <a:rPr lang="de-DE" smtClean="0"/>
+              <a:rPr lang="de-DE"/>
               <a:t>Master-Untertitelformat bearbeiten</a:t>
             </a:r>
             <a:endParaRPr lang="de-DE" dirty="0"/>
@@ -378,35 +393,35 @@
           <a:p>
             <a:pPr lvl="0"/>
             <a:r>
-              <a:rPr lang="de-DE" smtClean="0"/>
+              <a:rPr lang="de-DE"/>
               <a:t>Mastertextformat bearbeiten</a:t>
             </a:r>
           </a:p>
           <a:p>
             <a:pPr lvl="1"/>
             <a:r>
-              <a:rPr lang="de-DE" smtClean="0"/>
+              <a:rPr lang="de-DE"/>
               <a:t>Zweite Ebene</a:t>
             </a:r>
           </a:p>
           <a:p>
             <a:pPr lvl="2"/>
             <a:r>
-              <a:rPr lang="de-DE" smtClean="0"/>
+              <a:rPr lang="de-DE"/>
               <a:t>Dritte Ebene</a:t>
             </a:r>
           </a:p>
           <a:p>
             <a:pPr lvl="3"/>
             <a:r>
-              <a:rPr lang="de-DE" smtClean="0"/>
+              <a:rPr lang="de-DE"/>
               <a:t>Vierte Ebene</a:t>
             </a:r>
           </a:p>
           <a:p>
             <a:pPr lvl="4"/>
             <a:r>
-              <a:rPr lang="de-DE" smtClean="0"/>
+              <a:rPr lang="de-DE"/>
               <a:t>Fünfte Ebene</a:t>
             </a:r>
             <a:endParaRPr lang="de-DE" dirty="0"/>
@@ -436,7 +451,7 @@
           <a:lstStyle/>
           <a:p>
             <a:r>
-              <a:rPr lang="de-DE" sz="2400" dirty="0" smtClean="0">
+              <a:rPr lang="de-DE" sz="2400" dirty="0">
                 <a:solidFill>
                   <a:srgbClr val="7E006B"/>
                 </a:solidFill>
@@ -446,7 +461,7 @@
               <a:t>TRAININGS</a:t>
             </a:r>
             <a:r>
-              <a:rPr lang="de-DE" sz="2400" dirty="0" smtClean="0">
+              <a:rPr lang="de-DE" sz="2400" dirty="0">
                 <a:solidFill>
                   <a:srgbClr val="7E006B"/>
                 </a:solidFill>
@@ -497,14 +512,20 @@
       </p:pic>
       <p:sp>
         <p:nvSpPr>
-          <p:cNvPr id="5" name="Shape 7"/>
+          <p:cNvPr id="4" name="Shape 7">
+            <a:extLst>
+              <a:ext uri="{FF2B5EF4-FFF2-40B4-BE49-F238E27FC236}">
+                <a16:creationId xmlns:a16="http://schemas.microsoft.com/office/drawing/2014/main" id="{0045CE13-FCE5-6B93-B530-0FFC11DB7635}"/>
+              </a:ext>
+            </a:extLst>
+          </p:cNvPr>
           <p:cNvSpPr/>
           <p:nvPr userDrawn="1"/>
         </p:nvSpPr>
         <p:spPr>
           <a:xfrm>
-            <a:off x="1683417" y="4952581"/>
-            <a:ext cx="4196016" cy="276995"/>
+            <a:off x="971550" y="4689585"/>
+            <a:ext cx="4691860" cy="461661"/>
           </a:xfrm>
           <a:prstGeom prst="rect">
             <a:avLst/>
@@ -514,12 +535,12 @@
           </a:ln>
           <a:extLst>
             <a:ext uri="{C572A759-6A51-4108-AA02-DFA0A04FC94B}">
-              <ma14:wrappingTextBoxFlag xmlns:ma14="http://schemas.microsoft.com/office/mac/drawingml/2011/main" val="1"/>
+              <ma14:wrappingTextBoxFlag xmlns="" xmlns:ma14="http://schemas.microsoft.com/office/mac/drawingml/2011/main" val="1"/>
             </a:ext>
           </a:extLst>
         </p:spPr>
         <p:txBody>
-          <a:bodyPr wrap="none" lIns="45718" tIns="45718" rIns="45718" bIns="45718">
+          <a:bodyPr wrap="square" lIns="45718" tIns="45718" rIns="45718" bIns="45718">
             <a:spAutoFit/>
           </a:bodyPr>
           <a:lstStyle/>
@@ -528,49 +549,266 @@
               <a:defRPr sz="1800"/>
             </a:pPr>
             <a:r>
-              <a:rPr sz="600" dirty="0">
-                <a:latin typeface="Avenir Light"/>
+              <a:rPr lang="de-DE" sz="800" b="0" i="0" u="none" strike="noStrike" dirty="0" err="1">
+                <a:solidFill>
+                  <a:schemeClr val="tx1">
+                    <a:lumMod val="65000"/>
+                    <a:lumOff val="35000"/>
+                  </a:schemeClr>
+                </a:solidFill>
+                <a:effectLst/>
+                <a:latin typeface="Avenir Book" panose="02000503020000020003" pitchFamily="2" charset="0"/>
+              </a:rPr>
+              <a:t>music</a:t>
+            </a:r>
+            <a:r>
+              <a:rPr lang="de-DE" sz="800" b="0" i="0" u="none" strike="noStrike" dirty="0">
+                <a:solidFill>
+                  <a:schemeClr val="tx1">
+                    <a:lumMod val="65000"/>
+                    <a:lumOff val="35000"/>
+                  </a:schemeClr>
+                </a:solidFill>
+                <a:effectLst/>
+                <a:latin typeface="Avenir Book" panose="02000503020000020003" pitchFamily="2" charset="0"/>
+              </a:rPr>
+              <a:t> </a:t>
+            </a:r>
+            <a:r>
+              <a:rPr lang="de-DE" sz="800" b="0" i="0" u="none" strike="noStrike" dirty="0" err="1">
+                <a:solidFill>
+                  <a:schemeClr val="tx1">
+                    <a:lumMod val="65000"/>
+                    <a:lumOff val="35000"/>
+                  </a:schemeClr>
+                </a:solidFill>
+                <a:effectLst/>
+                <a:latin typeface="Avenir Book" panose="02000503020000020003" pitchFamily="2" charset="0"/>
+              </a:rPr>
+              <a:t>moves</a:t>
+            </a:r>
+            <a:r>
+              <a:rPr lang="de-DE" sz="800" b="0" i="0" u="none" strike="noStrike" dirty="0">
+                <a:solidFill>
+                  <a:schemeClr val="tx1">
+                    <a:lumMod val="65000"/>
+                    <a:lumOff val="35000"/>
+                  </a:schemeClr>
+                </a:solidFill>
+                <a:effectLst/>
+                <a:latin typeface="Avenir Book" panose="02000503020000020003" pitchFamily="2" charset="0"/>
+              </a:rPr>
+              <a:t>-Trainingskarten von Regina Brandhuber sind lizenziert unter einer Creative Commons </a:t>
+            </a:r>
+          </a:p>
+          <a:p>
+            <a:pPr lvl="0" algn="ctr">
+              <a:defRPr sz="1800"/>
+            </a:pPr>
+            <a:r>
+              <a:rPr lang="de-DE" sz="800" b="0" i="0" u="none" strike="noStrike" dirty="0">
+                <a:solidFill>
+                  <a:schemeClr val="tx1">
+                    <a:lumMod val="65000"/>
+                    <a:lumOff val="35000"/>
+                  </a:schemeClr>
+                </a:solidFill>
+                <a:effectLst/>
+                <a:latin typeface="Avenir Book" panose="02000503020000020003" pitchFamily="2" charset="0"/>
+              </a:rPr>
+              <a:t>Namensnennung-Nicht kommerziell 4.0 International Lizenz.</a:t>
+            </a:r>
+          </a:p>
+          <a:p>
+            <a:pPr lvl="0" algn="ctr">
+              <a:defRPr sz="1800"/>
+            </a:pPr>
+            <a:r>
+              <a:rPr lang="de-DE" sz="800" dirty="0">
+                <a:solidFill>
+                  <a:schemeClr val="tx1">
+                    <a:lumMod val="65000"/>
+                    <a:lumOff val="35000"/>
+                  </a:schemeClr>
+                </a:solidFill>
+                <a:latin typeface="Avenir Book" panose="02000503020000020003" pitchFamily="2" charset="0"/>
                 <a:ea typeface="Calibri"/>
                 <a:cs typeface="Avenir Light"/>
                 <a:sym typeface="Calibri"/>
               </a:rPr>
-              <a:t>This work is licensed under the Creative Commons Attribution-NonCommercial-NoDerivatives 4.0 International License. </a:t>
-            </a:r>
-          </a:p>
-          <a:p>
-            <a:pPr lvl="0" algn="ctr">
-              <a:defRPr sz="1800"/>
-            </a:pPr>
-            <a:r>
-              <a:rPr sz="600" dirty="0">
-                <a:latin typeface="Avenir Light"/>
+              <a:t>Nachzulesen unter:</a:t>
+            </a:r>
+            <a:r>
+              <a:rPr sz="800" dirty="0">
+                <a:solidFill>
+                  <a:schemeClr val="tx1">
+                    <a:lumMod val="65000"/>
+                    <a:lumOff val="35000"/>
+                  </a:schemeClr>
+                </a:solidFill>
+                <a:latin typeface="Avenir Book" panose="02000503020000020003" pitchFamily="2" charset="0"/>
                 <a:ea typeface="Calibri"/>
                 <a:cs typeface="Avenir Light"/>
                 <a:sym typeface="Calibri"/>
               </a:rPr>
-              <a:t>To view a copy of this license, visit http://creativecommons.org/licenses/by-nc-nd/4.0/.</a:t>
-            </a:r>
+              <a:t> </a:t>
+            </a:r>
+            <a:r>
+              <a:rPr lang="de-DE" sz="800" dirty="0">
+                <a:solidFill>
+                  <a:schemeClr val="tx1">
+                    <a:lumMod val="65000"/>
+                    <a:lumOff val="35000"/>
+                  </a:schemeClr>
+                </a:solidFill>
+                <a:latin typeface="Avenir Book" panose="02000503020000020003" pitchFamily="2" charset="0"/>
+                <a:ea typeface="Calibri"/>
+                <a:cs typeface="Avenir Light"/>
+                <a:sym typeface="Calibri"/>
+              </a:rPr>
+              <a:t>https://</a:t>
+            </a:r>
+            <a:r>
+              <a:rPr lang="de-DE" sz="800" dirty="0" err="1">
+                <a:solidFill>
+                  <a:schemeClr val="tx1">
+                    <a:lumMod val="65000"/>
+                    <a:lumOff val="35000"/>
+                  </a:schemeClr>
+                </a:solidFill>
+                <a:latin typeface="Avenir Book" panose="02000503020000020003" pitchFamily="2" charset="0"/>
+                <a:ea typeface="Calibri"/>
+                <a:cs typeface="Avenir Light"/>
+                <a:sym typeface="Calibri"/>
+              </a:rPr>
+              <a:t>creativecommons.org</a:t>
+            </a:r>
+            <a:r>
+              <a:rPr lang="de-DE" sz="800" dirty="0">
+                <a:solidFill>
+                  <a:schemeClr val="tx1">
+                    <a:lumMod val="65000"/>
+                    <a:lumOff val="35000"/>
+                  </a:schemeClr>
+                </a:solidFill>
+                <a:latin typeface="Avenir Book" panose="02000503020000020003" pitchFamily="2" charset="0"/>
+                <a:ea typeface="Calibri"/>
+                <a:cs typeface="Avenir Light"/>
+                <a:sym typeface="Calibri"/>
+              </a:rPr>
+              <a:t>/</a:t>
+            </a:r>
+            <a:r>
+              <a:rPr lang="de-DE" sz="800" dirty="0" err="1">
+                <a:solidFill>
+                  <a:schemeClr val="tx1">
+                    <a:lumMod val="65000"/>
+                    <a:lumOff val="35000"/>
+                  </a:schemeClr>
+                </a:solidFill>
+                <a:latin typeface="Avenir Book" panose="02000503020000020003" pitchFamily="2" charset="0"/>
+                <a:ea typeface="Calibri"/>
+                <a:cs typeface="Avenir Light"/>
+                <a:sym typeface="Calibri"/>
+              </a:rPr>
+              <a:t>licenses</a:t>
+            </a:r>
+            <a:r>
+              <a:rPr lang="de-DE" sz="800" dirty="0">
+                <a:solidFill>
+                  <a:schemeClr val="tx1">
+                    <a:lumMod val="65000"/>
+                    <a:lumOff val="35000"/>
+                  </a:schemeClr>
+                </a:solidFill>
+                <a:latin typeface="Avenir Book" panose="02000503020000020003" pitchFamily="2" charset="0"/>
+                <a:ea typeface="Calibri"/>
+                <a:cs typeface="Avenir Light"/>
+                <a:sym typeface="Calibri"/>
+              </a:rPr>
+              <a:t>/</a:t>
+            </a:r>
+            <a:r>
+              <a:rPr lang="de-DE" sz="800" dirty="0" err="1">
+                <a:solidFill>
+                  <a:schemeClr val="tx1">
+                    <a:lumMod val="65000"/>
+                    <a:lumOff val="35000"/>
+                  </a:schemeClr>
+                </a:solidFill>
+                <a:latin typeface="Avenir Book" panose="02000503020000020003" pitchFamily="2" charset="0"/>
+                <a:ea typeface="Calibri"/>
+                <a:cs typeface="Avenir Light"/>
+                <a:sym typeface="Calibri"/>
+              </a:rPr>
+              <a:t>by-nc</a:t>
+            </a:r>
+            <a:r>
+              <a:rPr lang="de-DE" sz="800" dirty="0">
+                <a:solidFill>
+                  <a:schemeClr val="tx1">
+                    <a:lumMod val="65000"/>
+                    <a:lumOff val="35000"/>
+                  </a:schemeClr>
+                </a:solidFill>
+                <a:latin typeface="Avenir Book" panose="02000503020000020003" pitchFamily="2" charset="0"/>
+                <a:ea typeface="Calibri"/>
+                <a:cs typeface="Avenir Light"/>
+                <a:sym typeface="Calibri"/>
+              </a:rPr>
+              <a:t>/4.0/</a:t>
+            </a:r>
+            <a:r>
+              <a:rPr lang="de-DE" sz="800" dirty="0" err="1">
+                <a:solidFill>
+                  <a:schemeClr val="tx1">
+                    <a:lumMod val="65000"/>
+                    <a:lumOff val="35000"/>
+                  </a:schemeClr>
+                </a:solidFill>
+                <a:latin typeface="Avenir Book" panose="02000503020000020003" pitchFamily="2" charset="0"/>
+                <a:ea typeface="Calibri"/>
+                <a:cs typeface="Avenir Light"/>
+                <a:sym typeface="Calibri"/>
+              </a:rPr>
+              <a:t>deed.de</a:t>
+            </a:r>
+            <a:endParaRPr sz="800" dirty="0">
+              <a:solidFill>
+                <a:schemeClr val="tx1">
+                  <a:lumMod val="65000"/>
+                  <a:lumOff val="35000"/>
+                </a:schemeClr>
+              </a:solidFill>
+              <a:latin typeface="Avenir Book" panose="02000503020000020003" pitchFamily="2" charset="0"/>
+              <a:ea typeface="Calibri"/>
+              <a:cs typeface="Avenir Light"/>
+              <a:sym typeface="Calibri"/>
+            </a:endParaRPr>
           </a:p>
         </p:txBody>
       </p:sp>
       <p:pic>
         <p:nvPicPr>
-          <p:cNvPr id="6" name="pasted-image.tif"/>
+          <p:cNvPr id="8" name="pasted-image.tif">
+            <a:extLst>
+              <a:ext uri="{FF2B5EF4-FFF2-40B4-BE49-F238E27FC236}">
+                <a16:creationId xmlns:a16="http://schemas.microsoft.com/office/drawing/2014/main" id="{A5D0377E-FEC1-094E-91E8-FF04D6D26750}"/>
+              </a:ext>
+            </a:extLst>
+          </p:cNvPr>
           <p:cNvPicPr/>
           <p:nvPr userDrawn="1"/>
         </p:nvPicPr>
-        <p:blipFill>
-          <a:blip r:embed="rId4">
-            <a:extLst/>
-          </a:blip>
-          <a:stretch>
-            <a:fillRect/>
-          </a:stretch>
+        <p:blipFill rotWithShape="1">
+          <a:blip r:embed="rId4"/>
+          <a:srcRect r="24777" b="-3233"/>
+          <a:stretch/>
         </p:blipFill>
         <p:spPr>
           <a:xfrm>
-            <a:off x="6174185" y="4992838"/>
-            <a:ext cx="886619" cy="214128"/>
+            <a:off x="5724347" y="4733926"/>
+            <a:ext cx="1009828" cy="333374"/>
           </a:xfrm>
           <a:prstGeom prst="rect">
             <a:avLst/>
@@ -580,58 +818,6 @@
           </a:ln>
         </p:spPr>
       </p:pic>
-      <p:sp>
-        <p:nvSpPr>
-          <p:cNvPr id="7" name="Textfeld 6"/>
-          <p:cNvSpPr txBox="1"/>
-          <p:nvPr userDrawn="1"/>
-        </p:nvSpPr>
-        <p:spPr>
-          <a:xfrm>
-            <a:off x="239285" y="4936890"/>
-            <a:ext cx="1044856" cy="276999"/>
-          </a:xfrm>
-          <a:prstGeom prst="rect">
-            <a:avLst/>
-          </a:prstGeom>
-          <a:noFill/>
-        </p:spPr>
-        <p:txBody>
-          <a:bodyPr wrap="square" rtlCol="0">
-            <a:spAutoFit/>
-          </a:bodyPr>
-          <a:lstStyle/>
-          <a:p>
-            <a:r>
-              <a:rPr lang="de-DE" sz="600" dirty="0">
-                <a:solidFill>
-                  <a:srgbClr val="5D5E5F"/>
-                </a:solidFill>
-                <a:latin typeface="Avenir Light"/>
-                <a:cs typeface="Avenir Light"/>
-              </a:rPr>
-              <a:t>Letzte Änderung: </a:t>
-            </a:r>
-            <a:fld id="{7A8C7DAC-E536-564C-B5B3-90E8FAB50562}" type="datetime1">
-              <a:rPr lang="de-DE" sz="600" smtClean="0">
-                <a:solidFill>
-                  <a:srgbClr val="5D5E5F"/>
-                </a:solidFill>
-                <a:latin typeface="Avenir Light"/>
-                <a:cs typeface="Avenir Light"/>
-              </a:rPr>
-              <a:t>19.01.16</a:t>
-            </a:fld>
-            <a:endParaRPr lang="de-DE" sz="600" dirty="0">
-              <a:solidFill>
-                <a:srgbClr val="5D5E5F"/>
-              </a:solidFill>
-              <a:latin typeface="Avenir Light"/>
-              <a:cs typeface="Avenir Light"/>
-            </a:endParaRPr>
-          </a:p>
-        </p:txBody>
-      </p:sp>
     </p:spTree>
     <p:extLst>
       <p:ext uri="{BB962C8B-B14F-4D97-AF65-F5344CB8AC3E}">
@@ -678,10 +864,9 @@
           <a:lstStyle/>
           <a:p>
             <a:r>
-              <a:rPr lang="de-DE" smtClean="0"/>
+              <a:rPr lang="de-DE"/>
               <a:t>Mastertitelformat bearbeiten</a:t>
             </a:r>
-            <a:endParaRPr lang="de-DE"/>
           </a:p>
         </p:txBody>
       </p:sp>
@@ -702,7 +887,7 @@
           <a:p>
             <a:fld id="{FF5B2BAF-DF38-0A48-A798-0C06E514FD52}" type="datetimeFigureOut">
               <a:rPr lang="de-DE" smtClean="0"/>
-              <a:t>19.01.16</a:t>
+              <a:t>27.07.23</a:t>
             </a:fld>
             <a:endParaRPr lang="de-DE" dirty="0"/>
           </a:p>
@@ -813,17 +998,16 @@
           <a:p>
             <a:pPr marL="0" lvl="0" algn="l"/>
             <a:r>
-              <a:rPr lang="de-DE" dirty="0" smtClean="0"/>
+              <a:rPr lang="de-DE" dirty="0"/>
               <a:t>Überschrift </a:t>
             </a:r>
             <a:br>
-              <a:rPr lang="de-DE" dirty="0" smtClean="0"/>
+              <a:rPr lang="de-DE" dirty="0"/>
             </a:br>
             <a:r>
-              <a:rPr lang="de-DE" dirty="0" smtClean="0"/>
+              <a:rPr lang="de-DE" dirty="0"/>
               <a:t>bearbeiten </a:t>
             </a:r>
-            <a:endParaRPr lang="de-DE" dirty="0"/>
           </a:p>
         </p:txBody>
       </p:sp>
@@ -854,38 +1038,37 @@
           <a:p>
             <a:pPr lvl="0"/>
             <a:r>
-              <a:rPr lang="de-DE" dirty="0" smtClean="0"/>
+              <a:rPr lang="de-DE" dirty="0"/>
               <a:t>Mastertextformat bearbeiten</a:t>
             </a:r>
           </a:p>
           <a:p>
             <a:pPr lvl="1"/>
             <a:r>
-              <a:rPr lang="de-DE" dirty="0" smtClean="0"/>
+              <a:rPr lang="de-DE" dirty="0"/>
               <a:t>Zweite Ebene</a:t>
             </a:r>
           </a:p>
           <a:p>
             <a:pPr lvl="2"/>
             <a:r>
-              <a:rPr lang="de-DE" dirty="0" smtClean="0"/>
+              <a:rPr lang="de-DE" dirty="0"/>
               <a:t>Dritte Ebene</a:t>
             </a:r>
           </a:p>
           <a:p>
             <a:pPr lvl="3"/>
             <a:r>
-              <a:rPr lang="de-DE" dirty="0" smtClean="0"/>
+              <a:rPr lang="de-DE" dirty="0"/>
               <a:t>Vierte Ebene</a:t>
             </a:r>
           </a:p>
           <a:p>
             <a:pPr lvl="4"/>
             <a:r>
-              <a:rPr lang="de-DE" dirty="0" smtClean="0"/>
+              <a:rPr lang="de-DE" dirty="0"/>
               <a:t>Fünfte Ebene</a:t>
             </a:r>
-            <a:endParaRPr lang="de-DE" dirty="0"/>
           </a:p>
         </p:txBody>
       </p:sp>
@@ -924,7 +1107,7 @@
           <a:p>
             <a:fld id="{FF5B2BAF-DF38-0A48-A798-0C06E514FD52}" type="datetimeFigureOut">
               <a:rPr lang="de-DE" smtClean="0"/>
-              <a:t>19.01.16</a:t>
+              <a:t>27.07.23</a:t>
             </a:fld>
             <a:endParaRPr lang="de-DE" dirty="0"/>
           </a:p>
@@ -1158,7 +1341,7 @@
           <a:lstStyle/>
           <a:p>
             <a:r>
-              <a:rPr lang="de-DE" sz="1050" b="1" dirty="0" smtClean="0">
+              <a:rPr lang="de-DE" sz="1050" b="1" dirty="0">
                 <a:solidFill>
                   <a:schemeClr val="bg1"/>
                 </a:solidFill>
@@ -1168,7 +1351,7 @@
               <a:t>TRAININGSKARTE</a:t>
             </a:r>
             <a:r>
-              <a:rPr lang="de-DE" sz="1050" dirty="0" smtClean="0">
+              <a:rPr lang="de-DE" sz="1050" dirty="0">
                 <a:solidFill>
                   <a:schemeClr val="bg1"/>
                 </a:solidFill>
@@ -1178,7 +1361,7 @@
               <a:t> </a:t>
             </a:r>
             <a:r>
-              <a:rPr lang="de-DE" sz="1050" b="1" dirty="0" smtClean="0">
+              <a:rPr lang="de-DE" sz="1050" b="1" dirty="0">
                 <a:solidFill>
                   <a:schemeClr val="bg1"/>
                 </a:solidFill>
@@ -1187,13 +1370,6 @@
               </a:rPr>
               <a:t>IDE 13</a:t>
             </a:r>
-            <a:endParaRPr lang="de-DE" sz="1050" b="1" dirty="0">
-              <a:solidFill>
-                <a:schemeClr val="bg1"/>
-              </a:solidFill>
-              <a:latin typeface="Avenir Heavy"/>
-              <a:cs typeface="Avenir Heavy"/>
-            </a:endParaRPr>
           </a:p>
         </p:txBody>
       </p:sp>
@@ -1576,17 +1752,16 @@
           <a:lstStyle/>
           <a:p>
             <a:r>
-              <a:rPr lang="de-DE" dirty="0" smtClean="0">
+              <a:rPr lang="de-DE" dirty="0">
                 <a:latin typeface="Avenir Heavy"/>
                 <a:cs typeface="Avenir Heavy"/>
               </a:rPr>
               <a:t>RAUS AUS DEM</a:t>
             </a:r>
             <a:r>
-              <a:rPr lang="de-DE" dirty="0" smtClean="0"/>
+              <a:rPr lang="de-DE" dirty="0"/>
               <a:t> SCHNECKENHAUS</a:t>
             </a:r>
-            <a:endParaRPr lang="de-DE" dirty="0"/>
           </a:p>
         </p:txBody>
       </p:sp>
@@ -1611,16 +1786,11 @@
               <a:rPr lang="de-DE" sz="1200" dirty="0"/>
               <a:t>Ideen anderen zu zeigen kann sich sehr intim anfühlen, wenn man es nicht gewohnt ist.</a:t>
             </a:r>
-            <a:endParaRPr lang="de-DE" sz="1200" dirty="0" smtClean="0"/>
-          </a:p>
-          <a:p>
-            <a:r>
-              <a:rPr lang="de-DE" sz="1200" dirty="0" smtClean="0"/>
-              <a:t>Jedoch </a:t>
-            </a:r>
+          </a:p>
+          <a:p>
             <a:r>
               <a:rPr lang="de-DE" sz="1200" dirty="0"/>
-              <a:t>erweitert der Austausch mit anderen Deine Wahrnehmung zu Deinen Ideen. Du kannst herausfinden, was andere gut oder schlecht finden. Du kannst neue Ideen bekommen, weil Du in einer Diskussion eine neue Perspektive erhältst.</a:t>
+              <a:t>Jedoch erweitert der Austausch mit anderen Deine Wahrnehmung zu Deinen Ideen. Du kannst herausfinden, was andere gut oder schlecht finden. Du kannst neue Ideen bekommen, weil Du in einer Diskussion eine neue Perspektive erhältst.</a:t>
             </a:r>
           </a:p>
           <a:p>
@@ -1640,7 +1810,6 @@
               <a:rPr lang="de-DE" sz="1200" dirty="0"/>
               <a:t>Jedes Gespräch über eine von Deinen Ideen wird den Bezug zu ihr ändern. Vielleicht findest Du sie plötzlich besser oder schlechter als vorher, vielleicht kommen Dir plötzlich zusätzliche Ideen. Vielleicht verwirfst Du die Idee sogar um am nächsten Tag zu merken, dass sie noch stärker und klarer zu Dir zurückkommt.</a:t>
             </a:r>
-            <a:endParaRPr lang="de-DE" sz="1200" dirty="0"/>
           </a:p>
         </p:txBody>
       </p:sp>
@@ -1663,10 +1832,9 @@
               <a:buNone/>
             </a:pPr>
             <a:r>
-              <a:rPr lang="de-DE" dirty="0" smtClean="0"/>
+              <a:rPr lang="de-DE" dirty="0"/>
               <a:t>Regina Brandhuber</a:t>
             </a:r>
-            <a:endParaRPr lang="de-DE" dirty="0"/>
           </a:p>
         </p:txBody>
       </p:sp>
@@ -1753,7 +1921,6 @@
               <a:rPr lang="de-DE" dirty="0"/>
               <a:t>Lass Deine Dokumentation von Deinem Team unterschreiben und Dich dadurch von ihm zertifizieren.</a:t>
             </a:r>
-            <a:endParaRPr lang="de-DE" dirty="0"/>
           </a:p>
         </p:txBody>
       </p:sp>

</xml_diff>